<commit_message>
Ready to insert screenshots.
</commit_message>
<xml_diff>
--- a/docs/MyLine.ppt.pptx
+++ b/docs/MyLine.ppt.pptx
@@ -6,6 +6,10 @@
   </p:sldMasterIdLst>
   <p:sldIdLst>
     <p:sldId id="256" r:id="rId2"/>
+    <p:sldId id="257" r:id="rId3"/>
+    <p:sldId id="258" r:id="rId4"/>
+    <p:sldId id="259" r:id="rId5"/>
+    <p:sldId id="260" r:id="rId6"/>
   </p:sldIdLst>
   <p:sldSz cx="12192000" cy="6858000"/>
   <p:notesSz cx="6858000" cy="9144000"/>
@@ -107,8 +111,16 @@
 </p:presentation>
 </file>
 
-<file path=ppt/revisionInfo.xml><?xml version="1.0" encoding="utf-8"?>
-<p1510:revInfo xmlns:a="http://schemas.openxmlformats.org/drawingml/2006/main" xmlns:r="http://schemas.openxmlformats.org/officeDocument/2006/relationships" xmlns:p1510="http://schemas.microsoft.com/office/powerpoint/2015/10/main"/>
+<file path=ppt/commentAuthors.xml><?xml version="1.0" encoding="utf-8"?>
+<p:cmAuthorLst xmlns:a="http://schemas.openxmlformats.org/drawingml/2006/main" xmlns:r="http://schemas.openxmlformats.org/officeDocument/2006/relationships" xmlns:p="http://schemas.openxmlformats.org/presentationml/2006/main">
+  <p:cmAuthor id="1" name="davis.orionr@gmail.com" initials="d" lastIdx="1" clrIdx="0">
+    <p:extLst>
+      <p:ext uri="{19B8F6BF-5375-455C-9EA6-DF929625EA0E}">
+        <p15:presenceInfo xmlns:p15="http://schemas.microsoft.com/office/powerpoint/2012/main" userId="d21585422d61b37b" providerId="Windows Live"/>
+      </p:ext>
+    </p:extLst>
+  </p:cmAuthor>
+</p:cmAuthorLst>
 </file>
 
 <file path=ppt/slideLayouts/slideLayout1.xml><?xml version="1.0" encoding="utf-8"?>
@@ -3518,9 +3530,10 @@
               <a:t>Tim </a:t>
             </a:r>
             <a:r>
-              <a:rPr lang="en-US"/>
+              <a:rPr lang="en-US" dirty="0" err="1"/>
               <a:t>Synder</a:t>
             </a:r>
+            <a:endParaRPr lang="en-US" dirty="0"/>
           </a:p>
         </p:txBody>
       </p:sp>
@@ -3528,6 +3541,412 @@
     <p:extLst>
       <p:ext uri="{BB962C8B-B14F-4D97-AF65-F5344CB8AC3E}">
         <p14:creationId xmlns:p14="http://schemas.microsoft.com/office/powerpoint/2010/main" val="718736048"/>
+      </p:ext>
+    </p:extLst>
+  </p:cSld>
+  <p:clrMapOvr>
+    <a:masterClrMapping/>
+  </p:clrMapOvr>
+</p:sld>
+</file>
+
+<file path=ppt/slides/slide2.xml><?xml version="1.0" encoding="utf-8"?>
+<p:sld xmlns:a="http://schemas.openxmlformats.org/drawingml/2006/main" xmlns:r="http://schemas.openxmlformats.org/officeDocument/2006/relationships" xmlns:p="http://schemas.openxmlformats.org/presentationml/2006/main">
+  <p:cSld>
+    <p:spTree>
+      <p:nvGrpSpPr>
+        <p:cNvPr id="1" name=""/>
+        <p:cNvGrpSpPr/>
+        <p:nvPr/>
+      </p:nvGrpSpPr>
+      <p:grpSpPr>
+        <a:xfrm>
+          <a:off x="0" y="0"/>
+          <a:ext cx="0" cy="0"/>
+          <a:chOff x="0" y="0"/>
+          <a:chExt cx="0" cy="0"/>
+        </a:xfrm>
+      </p:grpSpPr>
+      <p:sp>
+        <p:nvSpPr>
+          <p:cNvPr id="2" name="Title 1">
+            <a:extLst>
+              <a:ext uri="{FF2B5EF4-FFF2-40B4-BE49-F238E27FC236}">
+                <a16:creationId xmlns:a16="http://schemas.microsoft.com/office/drawing/2014/main" id="{B4C14CE5-5699-45D2-BC2C-069E8ABF4676}"/>
+              </a:ext>
+            </a:extLst>
+          </p:cNvPr>
+          <p:cNvSpPr>
+            <a:spLocks noGrp="1"/>
+          </p:cNvSpPr>
+          <p:nvPr>
+            <p:ph type="title"/>
+          </p:nvPr>
+        </p:nvSpPr>
+        <p:spPr/>
+        <p:txBody>
+          <a:bodyPr/>
+          <a:lstStyle/>
+          <a:p>
+            <a:r>
+              <a:rPr lang="en-US" dirty="0"/>
+              <a:t>Implementation</a:t>
+            </a:r>
+          </a:p>
+        </p:txBody>
+      </p:sp>
+      <p:sp>
+        <p:nvSpPr>
+          <p:cNvPr id="3" name="Content Placeholder 2">
+            <a:extLst>
+              <a:ext uri="{FF2B5EF4-FFF2-40B4-BE49-F238E27FC236}">
+                <a16:creationId xmlns:a16="http://schemas.microsoft.com/office/drawing/2014/main" id="{833BF3FD-6C6C-4622-93FA-9710FA31426A}"/>
+              </a:ext>
+            </a:extLst>
+          </p:cNvPr>
+          <p:cNvSpPr>
+            <a:spLocks noGrp="1"/>
+          </p:cNvSpPr>
+          <p:nvPr>
+            <p:ph idx="1"/>
+          </p:nvPr>
+        </p:nvSpPr>
+        <p:spPr/>
+        <p:txBody>
+          <a:bodyPr/>
+          <a:lstStyle/>
+          <a:p>
+            <a:r>
+              <a:rPr lang="en-US" dirty="0"/>
+              <a:t>PHP</a:t>
+            </a:r>
+          </a:p>
+          <a:p>
+            <a:r>
+              <a:rPr lang="en-US" dirty="0"/>
+              <a:t>MySQL</a:t>
+            </a:r>
+          </a:p>
+          <a:p>
+            <a:r>
+              <a:rPr lang="en-US" dirty="0"/>
+              <a:t>HTML</a:t>
+            </a:r>
+          </a:p>
+          <a:p>
+            <a:r>
+              <a:rPr lang="en-US" dirty="0"/>
+              <a:t>CSS</a:t>
+            </a:r>
+          </a:p>
+          <a:p>
+            <a:r>
+              <a:rPr lang="en-US" dirty="0"/>
+              <a:t>JavaScript</a:t>
+            </a:r>
+          </a:p>
+          <a:p>
+            <a:pPr marL="0" indent="0">
+              <a:buNone/>
+            </a:pPr>
+            <a:endParaRPr lang="en-US" dirty="0"/>
+          </a:p>
+        </p:txBody>
+      </p:sp>
+    </p:spTree>
+    <p:extLst>
+      <p:ext uri="{BB962C8B-B14F-4D97-AF65-F5344CB8AC3E}">
+        <p14:creationId xmlns:p14="http://schemas.microsoft.com/office/powerpoint/2010/main" val="2066266388"/>
+      </p:ext>
+    </p:extLst>
+  </p:cSld>
+  <p:clrMapOvr>
+    <a:masterClrMapping/>
+  </p:clrMapOvr>
+</p:sld>
+</file>
+
+<file path=ppt/slides/slide3.xml><?xml version="1.0" encoding="utf-8"?>
+<p:sld xmlns:a="http://schemas.openxmlformats.org/drawingml/2006/main" xmlns:r="http://schemas.openxmlformats.org/officeDocument/2006/relationships" xmlns:p="http://schemas.openxmlformats.org/presentationml/2006/main">
+  <p:cSld>
+    <p:spTree>
+      <p:nvGrpSpPr>
+        <p:cNvPr id="1" name=""/>
+        <p:cNvGrpSpPr/>
+        <p:nvPr/>
+      </p:nvGrpSpPr>
+      <p:grpSpPr>
+        <a:xfrm>
+          <a:off x="0" y="0"/>
+          <a:ext cx="0" cy="0"/>
+          <a:chOff x="0" y="0"/>
+          <a:chExt cx="0" cy="0"/>
+        </a:xfrm>
+      </p:grpSpPr>
+      <p:sp>
+        <p:nvSpPr>
+          <p:cNvPr id="2" name="Title 1">
+            <a:extLst>
+              <a:ext uri="{FF2B5EF4-FFF2-40B4-BE49-F238E27FC236}">
+                <a16:creationId xmlns:a16="http://schemas.microsoft.com/office/drawing/2014/main" id="{79D917A8-3BC7-4EE5-9CCF-2CDEE41904B0}"/>
+              </a:ext>
+            </a:extLst>
+          </p:cNvPr>
+          <p:cNvSpPr>
+            <a:spLocks noGrp="1"/>
+          </p:cNvSpPr>
+          <p:nvPr>
+            <p:ph type="title"/>
+          </p:nvPr>
+        </p:nvSpPr>
+        <p:spPr/>
+        <p:txBody>
+          <a:bodyPr/>
+          <a:lstStyle/>
+          <a:p>
+            <a:r>
+              <a:rPr lang="en-US" dirty="0"/>
+              <a:t>Screenshots</a:t>
+            </a:r>
+          </a:p>
+        </p:txBody>
+      </p:sp>
+      <p:sp>
+        <p:nvSpPr>
+          <p:cNvPr id="3" name="Content Placeholder 2">
+            <a:extLst>
+              <a:ext uri="{FF2B5EF4-FFF2-40B4-BE49-F238E27FC236}">
+                <a16:creationId xmlns:a16="http://schemas.microsoft.com/office/drawing/2014/main" id="{20EA023F-6045-4B46-BC7F-372025DC544F}"/>
+              </a:ext>
+            </a:extLst>
+          </p:cNvPr>
+          <p:cNvSpPr>
+            <a:spLocks noGrp="1"/>
+          </p:cNvSpPr>
+          <p:nvPr>
+            <p:ph idx="1"/>
+          </p:nvPr>
+        </p:nvSpPr>
+        <p:spPr/>
+        <p:txBody>
+          <a:bodyPr/>
+          <a:lstStyle/>
+          <a:p>
+            <a:pPr marL="0" indent="0">
+              <a:buNone/>
+            </a:pPr>
+            <a:endParaRPr lang="en-US" dirty="0"/>
+          </a:p>
+        </p:txBody>
+      </p:sp>
+    </p:spTree>
+    <p:extLst>
+      <p:ext uri="{BB962C8B-B14F-4D97-AF65-F5344CB8AC3E}">
+        <p14:creationId xmlns:p14="http://schemas.microsoft.com/office/powerpoint/2010/main" val="2703470759"/>
+      </p:ext>
+    </p:extLst>
+  </p:cSld>
+  <p:clrMapOvr>
+    <a:masterClrMapping/>
+  </p:clrMapOvr>
+</p:sld>
+</file>
+
+<file path=ppt/slides/slide4.xml><?xml version="1.0" encoding="utf-8"?>
+<p:sld xmlns:a="http://schemas.openxmlformats.org/drawingml/2006/main" xmlns:r="http://schemas.openxmlformats.org/officeDocument/2006/relationships" xmlns:p="http://schemas.openxmlformats.org/presentationml/2006/main">
+  <p:cSld>
+    <p:spTree>
+      <p:nvGrpSpPr>
+        <p:cNvPr id="1" name=""/>
+        <p:cNvGrpSpPr/>
+        <p:nvPr/>
+      </p:nvGrpSpPr>
+      <p:grpSpPr>
+        <a:xfrm>
+          <a:off x="0" y="0"/>
+          <a:ext cx="0" cy="0"/>
+          <a:chOff x="0" y="0"/>
+          <a:chExt cx="0" cy="0"/>
+        </a:xfrm>
+      </p:grpSpPr>
+      <p:sp>
+        <p:nvSpPr>
+          <p:cNvPr id="2" name="Title 1">
+            <a:extLst>
+              <a:ext uri="{FF2B5EF4-FFF2-40B4-BE49-F238E27FC236}">
+                <a16:creationId xmlns:a16="http://schemas.microsoft.com/office/drawing/2014/main" id="{A8F8773B-67BA-4BA3-A463-C12697791480}"/>
+              </a:ext>
+            </a:extLst>
+          </p:cNvPr>
+          <p:cNvSpPr>
+            <a:spLocks noGrp="1"/>
+          </p:cNvSpPr>
+          <p:nvPr>
+            <p:ph type="title"/>
+          </p:nvPr>
+        </p:nvSpPr>
+        <p:spPr/>
+        <p:txBody>
+          <a:bodyPr/>
+          <a:lstStyle/>
+          <a:p>
+            <a:r>
+              <a:rPr lang="en-US" dirty="0"/>
+              <a:t>Issues</a:t>
+            </a:r>
+          </a:p>
+        </p:txBody>
+      </p:sp>
+      <p:sp>
+        <p:nvSpPr>
+          <p:cNvPr id="3" name="Content Placeholder 2">
+            <a:extLst>
+              <a:ext uri="{FF2B5EF4-FFF2-40B4-BE49-F238E27FC236}">
+                <a16:creationId xmlns:a16="http://schemas.microsoft.com/office/drawing/2014/main" id="{B1E28B15-074F-4284-9F86-7969D6832A6C}"/>
+              </a:ext>
+            </a:extLst>
+          </p:cNvPr>
+          <p:cNvSpPr>
+            <a:spLocks noGrp="1"/>
+          </p:cNvSpPr>
+          <p:nvPr>
+            <p:ph idx="1"/>
+          </p:nvPr>
+        </p:nvSpPr>
+        <p:spPr/>
+        <p:txBody>
+          <a:bodyPr/>
+          <a:lstStyle/>
+          <a:p>
+            <a:r>
+              <a:rPr lang="en-US" dirty="0"/>
+              <a:t>Make the editor dynamic</a:t>
+            </a:r>
+          </a:p>
+          <a:p>
+            <a:r>
+              <a:rPr lang="en-US" dirty="0"/>
+              <a:t>How to represent timeline information</a:t>
+            </a:r>
+          </a:p>
+          <a:p>
+            <a:r>
+              <a:rPr lang="en-US" dirty="0"/>
+              <a:t>How to distribute application</a:t>
+            </a:r>
+          </a:p>
+          <a:p>
+            <a:endParaRPr lang="en-US" dirty="0"/>
+          </a:p>
+        </p:txBody>
+      </p:sp>
+    </p:spTree>
+    <p:extLst>
+      <p:ext uri="{BB962C8B-B14F-4D97-AF65-F5344CB8AC3E}">
+        <p14:creationId xmlns:p14="http://schemas.microsoft.com/office/powerpoint/2010/main" val="454489859"/>
+      </p:ext>
+    </p:extLst>
+  </p:cSld>
+  <p:clrMapOvr>
+    <a:masterClrMapping/>
+  </p:clrMapOvr>
+</p:sld>
+</file>
+
+<file path=ppt/slides/slide5.xml><?xml version="1.0" encoding="utf-8"?>
+<p:sld xmlns:a="http://schemas.openxmlformats.org/drawingml/2006/main" xmlns:r="http://schemas.openxmlformats.org/officeDocument/2006/relationships" xmlns:p="http://schemas.openxmlformats.org/presentationml/2006/main">
+  <p:cSld>
+    <p:spTree>
+      <p:nvGrpSpPr>
+        <p:cNvPr id="1" name=""/>
+        <p:cNvGrpSpPr/>
+        <p:nvPr/>
+      </p:nvGrpSpPr>
+      <p:grpSpPr>
+        <a:xfrm>
+          <a:off x="0" y="0"/>
+          <a:ext cx="0" cy="0"/>
+          <a:chOff x="0" y="0"/>
+          <a:chExt cx="0" cy="0"/>
+        </a:xfrm>
+      </p:grpSpPr>
+      <p:sp>
+        <p:nvSpPr>
+          <p:cNvPr id="2" name="Title 1">
+            <a:extLst>
+              <a:ext uri="{FF2B5EF4-FFF2-40B4-BE49-F238E27FC236}">
+                <a16:creationId xmlns:a16="http://schemas.microsoft.com/office/drawing/2014/main" id="{EEDC02B9-62EF-41A3-BB25-114C18EEF615}"/>
+              </a:ext>
+            </a:extLst>
+          </p:cNvPr>
+          <p:cNvSpPr>
+            <a:spLocks noGrp="1"/>
+          </p:cNvSpPr>
+          <p:nvPr>
+            <p:ph type="title"/>
+          </p:nvPr>
+        </p:nvSpPr>
+        <p:spPr/>
+        <p:txBody>
+          <a:bodyPr/>
+          <a:lstStyle/>
+          <a:p>
+            <a:r>
+              <a:rPr lang="en-US" dirty="0"/>
+              <a:t>Conclusions</a:t>
+            </a:r>
+          </a:p>
+        </p:txBody>
+      </p:sp>
+      <p:sp>
+        <p:nvSpPr>
+          <p:cNvPr id="3" name="Content Placeholder 2">
+            <a:extLst>
+              <a:ext uri="{FF2B5EF4-FFF2-40B4-BE49-F238E27FC236}">
+                <a16:creationId xmlns:a16="http://schemas.microsoft.com/office/drawing/2014/main" id="{6873E85C-5B0E-4352-9982-3F5BF494543C}"/>
+              </a:ext>
+            </a:extLst>
+          </p:cNvPr>
+          <p:cNvSpPr>
+            <a:spLocks noGrp="1"/>
+          </p:cNvSpPr>
+          <p:nvPr>
+            <p:ph idx="1"/>
+          </p:nvPr>
+        </p:nvSpPr>
+        <p:spPr/>
+        <p:txBody>
+          <a:bodyPr/>
+          <a:lstStyle/>
+          <a:p>
+            <a:r>
+              <a:rPr lang="en-US" dirty="0"/>
+              <a:t>Learned how to develop full scale web application</a:t>
+            </a:r>
+          </a:p>
+          <a:p>
+            <a:r>
+              <a:rPr lang="en-US" dirty="0"/>
+              <a:t>Learned how to represent data with JSON</a:t>
+            </a:r>
+          </a:p>
+          <a:p>
+            <a:r>
+              <a:rPr lang="en-US" dirty="0"/>
+              <a:t>Learned about deploying </a:t>
+            </a:r>
+            <a:r>
+              <a:rPr lang="en-US"/>
+              <a:t>web applications</a:t>
+            </a:r>
+            <a:endParaRPr lang="en-US" dirty="0"/>
+          </a:p>
+        </p:txBody>
+      </p:sp>
+    </p:spTree>
+    <p:extLst>
+      <p:ext uri="{BB962C8B-B14F-4D97-AF65-F5344CB8AC3E}">
+        <p14:creationId xmlns:p14="http://schemas.microsoft.com/office/powerpoint/2010/main" val="4231299029"/>
       </p:ext>
     </p:extLst>
   </p:cSld>

</xml_diff>

<commit_message>
Waiting to add screenshots.
</commit_message>
<xml_diff>
--- a/docs/MyLine.ppt.pptx
+++ b/docs/MyLine.ppt.pptx
@@ -3933,13 +3933,8 @@
           <a:p>
             <a:r>
               <a:rPr lang="en-US" dirty="0"/>
-              <a:t>Learned about deploying </a:t>
-            </a:r>
-            <a:r>
-              <a:rPr lang="en-US"/>
-              <a:t>web applications</a:t>
-            </a:r>
-            <a:endParaRPr lang="en-US" dirty="0"/>
+              <a:t>Learned about deploying web applications</a:t>
+            </a:r>
           </a:p>
         </p:txBody>
       </p:sp>

</xml_diff>

<commit_message>
Added a few screenshots to the ppt.
</commit_message>
<xml_diff>
--- a/docs/MyLine.ppt.pptx
+++ b/docs/MyLine.ppt.pptx
@@ -108,6 +108,11 @@
       </a:defRPr>
     </a:lvl9pPr>
   </p:defaultTextStyle>
+  <p:extLst>
+    <p:ext uri="{EFAFB233-063F-42B5-8137-9DF3F51BA10A}">
+      <p15:sldGuideLst xmlns:p15="http://schemas.microsoft.com/office/powerpoint/2012/main"/>
+    </p:ext>
+  </p:extLst>
 </p:presentation>
 </file>
 
@@ -121,6 +126,10 @@
     </p:extLst>
   </p:cmAuthor>
 </p:cmAuthorLst>
+</file>
+
+<file path=ppt/revisionInfo.xml><?xml version="1.0" encoding="utf-8"?>
+<p1510:revInfo xmlns:a="http://schemas.openxmlformats.org/drawingml/2006/main" xmlns:r="http://schemas.openxmlformats.org/officeDocument/2006/relationships" xmlns:p1510="http://schemas.microsoft.com/office/powerpoint/2015/10/main"/>
 </file>
 
 <file path=ppt/slideLayouts/slideLayout1.xml><?xml version="1.0" encoding="utf-8"?>
@@ -291,7 +300,7 @@
           <a:p>
             <a:fld id="{BA33CA24-DDC4-40CF-BCB4-0CD7BCE904F2}" type="datetimeFigureOut">
               <a:rPr lang="en-US" smtClean="0"/>
-              <a:t>11/27/2017</a:t>
+              <a:t>11/28/2017</a:t>
             </a:fld>
             <a:endParaRPr lang="en-US"/>
           </a:p>
@@ -519,7 +528,7 @@
           <a:p>
             <a:fld id="{BA33CA24-DDC4-40CF-BCB4-0CD7BCE904F2}" type="datetimeFigureOut">
               <a:rPr lang="en-US" smtClean="0"/>
-              <a:t>11/27/2017</a:t>
+              <a:t>11/28/2017</a:t>
             </a:fld>
             <a:endParaRPr lang="en-US"/>
           </a:p>
@@ -699,7 +708,7 @@
           <a:p>
             <a:fld id="{BA33CA24-DDC4-40CF-BCB4-0CD7BCE904F2}" type="datetimeFigureOut">
               <a:rPr lang="en-US" smtClean="0"/>
-              <a:t>11/27/2017</a:t>
+              <a:t>11/28/2017</a:t>
             </a:fld>
             <a:endParaRPr lang="en-US"/>
           </a:p>
@@ -869,7 +878,7 @@
           <a:p>
             <a:fld id="{BA33CA24-DDC4-40CF-BCB4-0CD7BCE904F2}" type="datetimeFigureOut">
               <a:rPr lang="en-US" smtClean="0"/>
-              <a:t>11/27/2017</a:t>
+              <a:t>11/28/2017</a:t>
             </a:fld>
             <a:endParaRPr lang="en-US"/>
           </a:p>
@@ -1123,7 +1132,7 @@
           <a:p>
             <a:fld id="{BA33CA24-DDC4-40CF-BCB4-0CD7BCE904F2}" type="datetimeFigureOut">
               <a:rPr lang="en-US" smtClean="0"/>
-              <a:t>11/27/2017</a:t>
+              <a:t>11/28/2017</a:t>
             </a:fld>
             <a:endParaRPr lang="en-US"/>
           </a:p>
@@ -1449,7 +1458,7 @@
           <a:p>
             <a:fld id="{BA33CA24-DDC4-40CF-BCB4-0CD7BCE904F2}" type="datetimeFigureOut">
               <a:rPr lang="en-US" smtClean="0"/>
-              <a:t>11/27/2017</a:t>
+              <a:t>11/28/2017</a:t>
             </a:fld>
             <a:endParaRPr lang="en-US"/>
           </a:p>
@@ -1900,7 +1909,7 @@
           <a:p>
             <a:fld id="{BA33CA24-DDC4-40CF-BCB4-0CD7BCE904F2}" type="datetimeFigureOut">
               <a:rPr lang="en-US" smtClean="0"/>
-              <a:t>11/27/2017</a:t>
+              <a:t>11/28/2017</a:t>
             </a:fld>
             <a:endParaRPr lang="en-US"/>
           </a:p>
@@ -2018,7 +2027,7 @@
           <a:p>
             <a:fld id="{BA33CA24-DDC4-40CF-BCB4-0CD7BCE904F2}" type="datetimeFigureOut">
               <a:rPr lang="en-US" smtClean="0"/>
-              <a:t>11/27/2017</a:t>
+              <a:t>11/28/2017</a:t>
             </a:fld>
             <a:endParaRPr lang="en-US"/>
           </a:p>
@@ -2113,7 +2122,7 @@
           <a:p>
             <a:fld id="{BA33CA24-DDC4-40CF-BCB4-0CD7BCE904F2}" type="datetimeFigureOut">
               <a:rPr lang="en-US" smtClean="0"/>
-              <a:t>11/27/2017</a:t>
+              <a:t>11/28/2017</a:t>
             </a:fld>
             <a:endParaRPr lang="en-US"/>
           </a:p>
@@ -2400,7 +2409,7 @@
           <a:p>
             <a:fld id="{BA33CA24-DDC4-40CF-BCB4-0CD7BCE904F2}" type="datetimeFigureOut">
               <a:rPr lang="en-US" smtClean="0"/>
-              <a:t>11/27/2017</a:t>
+              <a:t>11/28/2017</a:t>
             </a:fld>
             <a:endParaRPr lang="en-US"/>
           </a:p>
@@ -2722,7 +2731,7 @@
           <a:p>
             <a:fld id="{BA33CA24-DDC4-40CF-BCB4-0CD7BCE904F2}" type="datetimeFigureOut">
               <a:rPr lang="en-US" smtClean="0"/>
-              <a:t>11/27/2017</a:t>
+              <a:t>11/28/2017</a:t>
             </a:fld>
             <a:endParaRPr lang="en-US"/>
           </a:p>
@@ -2976,7 +2985,7 @@
           <a:p>
             <a:fld id="{BA33CA24-DDC4-40CF-BCB4-0CD7BCE904F2}" type="datetimeFigureOut">
               <a:rPr lang="en-US" smtClean="0"/>
-              <a:t>11/27/2017</a:t>
+              <a:t>11/28/2017</a:t>
             </a:fld>
             <a:endParaRPr lang="en-US"/>
           </a:p>
@@ -3711,34 +3720,114 @@
           </a:p>
         </p:txBody>
       </p:sp>
-      <p:sp>
-        <p:nvSpPr>
-          <p:cNvPr id="3" name="Content Placeholder 2">
+      <p:pic>
+        <p:nvPicPr>
+          <p:cNvPr id="5" name="Picture 4">
             <a:extLst>
               <a:ext uri="{FF2B5EF4-FFF2-40B4-BE49-F238E27FC236}">
-                <a16:creationId xmlns:a16="http://schemas.microsoft.com/office/drawing/2014/main" id="{20EA023F-6045-4B46-BC7F-372025DC544F}"/>
+                <a16:creationId xmlns:a16="http://schemas.microsoft.com/office/drawing/2014/main" id="{C9E0A9AD-AC7A-495D-AA0D-79FDAF2C001E}"/>
               </a:ext>
             </a:extLst>
           </p:cNvPr>
-          <p:cNvSpPr>
-            <a:spLocks noGrp="1"/>
-          </p:cNvSpPr>
-          <p:nvPr>
-            <p:ph idx="1"/>
-          </p:nvPr>
-        </p:nvSpPr>
-        <p:spPr/>
-        <p:txBody>
-          <a:bodyPr/>
-          <a:lstStyle/>
-          <a:p>
-            <a:pPr marL="0" indent="0">
-              <a:buNone/>
-            </a:pPr>
-            <a:endParaRPr lang="en-US" dirty="0"/>
-          </a:p>
-        </p:txBody>
-      </p:sp>
+          <p:cNvPicPr>
+            <a:picLocks noChangeAspect="1"/>
+          </p:cNvPicPr>
+          <p:nvPr/>
+        </p:nvPicPr>
+        <p:blipFill>
+          <a:blip r:embed="rId2">
+            <a:extLst>
+              <a:ext uri="{28A0092B-C50C-407E-A947-70E740481C1C}">
+                <a14:useLocalDpi xmlns:a14="http://schemas.microsoft.com/office/drawing/2010/main" val="0"/>
+              </a:ext>
+            </a:extLst>
+          </a:blip>
+          <a:stretch>
+            <a:fillRect/>
+          </a:stretch>
+        </p:blipFill>
+        <p:spPr>
+          <a:xfrm>
+            <a:off x="158816" y="1691321"/>
+            <a:ext cx="4566045" cy="2078573"/>
+          </a:xfrm>
+          <a:prstGeom prst="rect">
+            <a:avLst/>
+          </a:prstGeom>
+        </p:spPr>
+      </p:pic>
+      <p:pic>
+        <p:nvPicPr>
+          <p:cNvPr id="7" name="Picture 6">
+            <a:extLst>
+              <a:ext uri="{FF2B5EF4-FFF2-40B4-BE49-F238E27FC236}">
+                <a16:creationId xmlns:a16="http://schemas.microsoft.com/office/drawing/2014/main" id="{CC587814-FC25-4607-B285-BE064B54E421}"/>
+              </a:ext>
+            </a:extLst>
+          </p:cNvPr>
+          <p:cNvPicPr>
+            <a:picLocks noChangeAspect="1"/>
+          </p:cNvPicPr>
+          <p:nvPr/>
+        </p:nvPicPr>
+        <p:blipFill>
+          <a:blip r:embed="rId3">
+            <a:extLst>
+              <a:ext uri="{28A0092B-C50C-407E-A947-70E740481C1C}">
+                <a14:useLocalDpi xmlns:a14="http://schemas.microsoft.com/office/drawing/2010/main" val="0"/>
+              </a:ext>
+            </a:extLst>
+          </a:blip>
+          <a:stretch>
+            <a:fillRect/>
+          </a:stretch>
+        </p:blipFill>
+        <p:spPr>
+          <a:xfrm>
+            <a:off x="5364941" y="282676"/>
+            <a:ext cx="5565187" cy="3337602"/>
+          </a:xfrm>
+          <a:prstGeom prst="rect">
+            <a:avLst/>
+          </a:prstGeom>
+        </p:spPr>
+      </p:pic>
+      <p:pic>
+        <p:nvPicPr>
+          <p:cNvPr id="9" name="Picture 8">
+            <a:extLst>
+              <a:ext uri="{FF2B5EF4-FFF2-40B4-BE49-F238E27FC236}">
+                <a16:creationId xmlns:a16="http://schemas.microsoft.com/office/drawing/2014/main" id="{8CCC55E8-A227-491A-B862-90703A6F4953}"/>
+              </a:ext>
+            </a:extLst>
+          </p:cNvPr>
+          <p:cNvPicPr>
+            <a:picLocks noChangeAspect="1"/>
+          </p:cNvPicPr>
+          <p:nvPr/>
+        </p:nvPicPr>
+        <p:blipFill>
+          <a:blip r:embed="rId4">
+            <a:extLst>
+              <a:ext uri="{28A0092B-C50C-407E-A947-70E740481C1C}">
+                <a14:useLocalDpi xmlns:a14="http://schemas.microsoft.com/office/drawing/2010/main" val="0"/>
+              </a:ext>
+            </a:extLst>
+          </a:blip>
+          <a:stretch>
+            <a:fillRect/>
+          </a:stretch>
+        </p:blipFill>
+        <p:spPr>
+          <a:xfrm>
+            <a:off x="2203934" y="3425028"/>
+            <a:ext cx="5943600" cy="3150296"/>
+          </a:xfrm>
+          <a:prstGeom prst="rect">
+            <a:avLst/>
+          </a:prstGeom>
+        </p:spPr>
+      </p:pic>
     </p:spTree>
     <p:extLst>
       <p:ext uri="{BB962C8B-B14F-4D97-AF65-F5344CB8AC3E}">
@@ -3933,7 +4022,7 @@
           <a:p>
             <a:r>
               <a:rPr lang="en-US" dirty="0"/>
-              <a:t>Learned about deploying web applications</a:t>
+              <a:t>Learned basics of deploying web applications</a:t>
             </a:r>
           </a:p>
         </p:txBody>

</xml_diff>